<commit_message>
fix duplicate event bugs
</commit_message>
<xml_diff>
--- a/docs/diagrams/PollsClassDiagram.pptx
+++ b/docs/diagrams/PollsClassDiagram.pptx
@@ -208,7 +208,7 @@
           <a:p>
             <a:fld id="{F5CC4B3F-88C1-4FFA-B1B6-F41C21DC6924}" type="datetimeFigureOut">
               <a:rPr lang="en-US" smtClean="0"/>
-              <a:t>11/5/2018</a:t>
+              <a:t>11/11/2018</a:t>
             </a:fld>
             <a:endParaRPr lang="en-US"/>
           </a:p>
@@ -654,7 +654,7 @@
           <a:p>
             <a:fld id="{78C97017-6FC3-485B-9764-EAC9E56C1D49}" type="datetimeFigureOut">
               <a:rPr lang="en-US" smtClean="0"/>
-              <a:t>11/5/2018</a:t>
+              <a:t>11/11/2018</a:t>
             </a:fld>
             <a:endParaRPr lang="en-US"/>
           </a:p>
@@ -822,7 +822,7 @@
           <a:p>
             <a:fld id="{78C97017-6FC3-485B-9764-EAC9E56C1D49}" type="datetimeFigureOut">
               <a:rPr lang="en-US" smtClean="0"/>
-              <a:t>11/5/2018</a:t>
+              <a:t>11/11/2018</a:t>
             </a:fld>
             <a:endParaRPr lang="en-US"/>
           </a:p>
@@ -1000,7 +1000,7 @@
           <a:p>
             <a:fld id="{78C97017-6FC3-485B-9764-EAC9E56C1D49}" type="datetimeFigureOut">
               <a:rPr lang="en-US" smtClean="0"/>
-              <a:t>11/5/2018</a:t>
+              <a:t>11/11/2018</a:t>
             </a:fld>
             <a:endParaRPr lang="en-US"/>
           </a:p>
@@ -1168,7 +1168,7 @@
           <a:p>
             <a:fld id="{78C97017-6FC3-485B-9764-EAC9E56C1D49}" type="datetimeFigureOut">
               <a:rPr lang="en-US" smtClean="0"/>
-              <a:t>11/5/2018</a:t>
+              <a:t>11/11/2018</a:t>
             </a:fld>
             <a:endParaRPr lang="en-US"/>
           </a:p>
@@ -1413,7 +1413,7 @@
           <a:p>
             <a:fld id="{78C97017-6FC3-485B-9764-EAC9E56C1D49}" type="datetimeFigureOut">
               <a:rPr lang="en-US" smtClean="0"/>
-              <a:t>11/5/2018</a:t>
+              <a:t>11/11/2018</a:t>
             </a:fld>
             <a:endParaRPr lang="en-US"/>
           </a:p>
@@ -1698,7 +1698,7 @@
           <a:p>
             <a:fld id="{78C97017-6FC3-485B-9764-EAC9E56C1D49}" type="datetimeFigureOut">
               <a:rPr lang="en-US" smtClean="0"/>
-              <a:t>11/5/2018</a:t>
+              <a:t>11/11/2018</a:t>
             </a:fld>
             <a:endParaRPr lang="en-US"/>
           </a:p>
@@ -2117,7 +2117,7 @@
           <a:p>
             <a:fld id="{78C97017-6FC3-485B-9764-EAC9E56C1D49}" type="datetimeFigureOut">
               <a:rPr lang="en-US" smtClean="0"/>
-              <a:t>11/5/2018</a:t>
+              <a:t>11/11/2018</a:t>
             </a:fld>
             <a:endParaRPr lang="en-US"/>
           </a:p>
@@ -2234,7 +2234,7 @@
           <a:p>
             <a:fld id="{78C97017-6FC3-485B-9764-EAC9E56C1D49}" type="datetimeFigureOut">
               <a:rPr lang="en-US" smtClean="0"/>
-              <a:t>11/5/2018</a:t>
+              <a:t>11/11/2018</a:t>
             </a:fld>
             <a:endParaRPr lang="en-US"/>
           </a:p>
@@ -2329,7 +2329,7 @@
           <a:p>
             <a:fld id="{78C97017-6FC3-485B-9764-EAC9E56C1D49}" type="datetimeFigureOut">
               <a:rPr lang="en-US" smtClean="0"/>
-              <a:t>11/5/2018</a:t>
+              <a:t>11/11/2018</a:t>
             </a:fld>
             <a:endParaRPr lang="en-US"/>
           </a:p>
@@ -2604,7 +2604,7 @@
           <a:p>
             <a:fld id="{78C97017-6FC3-485B-9764-EAC9E56C1D49}" type="datetimeFigureOut">
               <a:rPr lang="en-US" smtClean="0"/>
-              <a:t>11/5/2018</a:t>
+              <a:t>11/11/2018</a:t>
             </a:fld>
             <a:endParaRPr lang="en-US"/>
           </a:p>
@@ -2856,7 +2856,7 @@
           <a:p>
             <a:fld id="{78C97017-6FC3-485B-9764-EAC9E56C1D49}" type="datetimeFigureOut">
               <a:rPr lang="en-US" smtClean="0"/>
-              <a:t>11/5/2018</a:t>
+              <a:t>11/11/2018</a:t>
             </a:fld>
             <a:endParaRPr lang="en-US"/>
           </a:p>
@@ -3067,7 +3067,7 @@
           <a:p>
             <a:fld id="{78C97017-6FC3-485B-9764-EAC9E56C1D49}" type="datetimeFigureOut">
               <a:rPr lang="en-US" smtClean="0"/>
-              <a:t>11/5/2018</a:t>
+              <a:t>11/11/2018</a:t>
             </a:fld>
             <a:endParaRPr lang="en-US"/>
           </a:p>
@@ -3513,7 +3513,7 @@
         <p:grpSpPr>
           <a:xfrm>
             <a:off x="86294" y="516725"/>
-            <a:ext cx="2838450" cy="3458981"/>
+            <a:ext cx="2838450" cy="3902875"/>
             <a:chOff x="1475968" y="225083"/>
             <a:chExt cx="2838450" cy="3458981"/>
           </a:xfrm>
@@ -3642,7 +3642,7 @@
                     <a:schemeClr val="tx1"/>
                   </a:solidFill>
                 </a:rPr>
-                <a:t># id : int</a:t>
+                <a:t>#id: int</a:t>
               </a:r>
             </a:p>
             <a:p>
@@ -3652,7 +3652,7 @@
                     <a:schemeClr val="tx1"/>
                   </a:solidFill>
                 </a:rPr>
-                <a:t># </a:t>
+                <a:t>#</a:t>
               </a:r>
               <a:r>
                 <a:rPr lang="en-SG" sz="1050" dirty="0" err="1">
@@ -3668,7 +3668,7 @@
                     <a:schemeClr val="tx1"/>
                   </a:solidFill>
                 </a:rPr>
-                <a:t> : String</a:t>
+                <a:t>: String</a:t>
               </a:r>
             </a:p>
             <a:p>
@@ -3678,7 +3678,7 @@
                     <a:schemeClr val="tx1"/>
                   </a:solidFill>
                 </a:rPr>
-                <a:t># </a:t>
+                <a:t>#</a:t>
               </a:r>
               <a:r>
                 <a:rPr lang="en-SG" sz="1050" dirty="0" err="1">
@@ -3694,7 +3694,7 @@
                     <a:schemeClr val="tx1"/>
                   </a:solidFill>
                 </a:rPr>
-                <a:t> : HashMap&lt;String, </a:t>
+                <a:t>: HashMap&lt;String, </a:t>
               </a:r>
               <a:r>
                 <a:rPr lang="en-SG" sz="1050" dirty="0" err="1">
@@ -3774,7 +3774,7 @@
                     <a:schemeClr val="tx1"/>
                   </a:solidFill>
                 </a:rPr>
-                <a:t>getId</a:t>
+                <a:t>AbstractPoll</a:t>
               </a:r>
               <a:r>
                 <a:rPr lang="en-SG" sz="1050" dirty="0">
@@ -3782,7 +3782,55 @@
                     <a:schemeClr val="tx1"/>
                   </a:solidFill>
                 </a:rPr>
-                <a:t>()</a:t>
+                <a:t>(</a:t>
+              </a:r>
+              <a:r>
+                <a:rPr lang="en-SG" sz="1050" dirty="0"/>
+                <a:t>id: int, </a:t>
+              </a:r>
+              <a:r>
+                <a:rPr lang="en-SG" sz="1050" dirty="0" err="1"/>
+                <a:t>pollName</a:t>
+              </a:r>
+              <a:r>
+                <a:rPr lang="en-SG" sz="1050" dirty="0"/>
+                <a:t>: String, </a:t>
+              </a:r>
+              <a:r>
+                <a:rPr lang="en-SG" sz="1050" dirty="0" err="1">
+                  <a:solidFill>
+                    <a:schemeClr val="tx1"/>
+                  </a:solidFill>
+                </a:rPr>
+                <a:t>pollData</a:t>
+              </a:r>
+              <a:r>
+                <a:rPr lang="en-SG" sz="1050" dirty="0">
+                  <a:solidFill>
+                    <a:schemeClr val="tx1"/>
+                  </a:solidFill>
+                </a:rPr>
+                <a:t>: HashMap&lt;String, </a:t>
+              </a:r>
+              <a:r>
+                <a:rPr lang="en-SG" sz="1050" dirty="0" err="1">
+                  <a:solidFill>
+                    <a:schemeClr val="tx1"/>
+                  </a:solidFill>
+                </a:rPr>
+                <a:t>UniquePersonList</a:t>
+              </a:r>
+              <a:r>
+                <a:rPr lang="en-SG" sz="1050" dirty="0">
+                  <a:solidFill>
+                    <a:schemeClr val="tx1"/>
+                  </a:solidFill>
+                </a:rPr>
+                <a:t>&gt;</a:t>
+              </a:r>
+              <a:r>
+                <a:rPr lang="en-SG" sz="1050" dirty="0"/>
+                <a:t>)</a:t>
               </a:r>
             </a:p>
             <a:p>
@@ -3800,7 +3848,7 @@
                     <a:schemeClr val="tx1"/>
                   </a:solidFill>
                 </a:rPr>
-                <a:t>getPollName</a:t>
+                <a:t>getId</a:t>
               </a:r>
               <a:r>
                 <a:rPr lang="en-SG" sz="1050" dirty="0">
@@ -3826,7 +3874,7 @@
                     <a:schemeClr val="tx1"/>
                   </a:solidFill>
                 </a:rPr>
-                <a:t>getPollData</a:t>
+                <a:t>getPollName</a:t>
               </a:r>
               <a:r>
                 <a:rPr lang="en-SG" sz="1050" dirty="0">
@@ -3852,7 +3900,7 @@
                     <a:schemeClr val="tx1"/>
                   </a:solidFill>
                 </a:rPr>
-                <a:t>addVote</a:t>
+                <a:t>getPollData</a:t>
               </a:r>
               <a:r>
                 <a:rPr lang="en-SG" sz="1050" dirty="0">
@@ -3860,7 +3908,7 @@
                     <a:schemeClr val="tx1"/>
                   </a:solidFill>
                 </a:rPr>
-                <a:t>(option: String, person: Person)</a:t>
+                <a:t>()</a:t>
               </a:r>
             </a:p>
             <a:p>
@@ -3878,7 +3926,7 @@
                     <a:schemeClr val="tx1"/>
                   </a:solidFill>
                 </a:rPr>
-                <a:t>updatePerson</a:t>
+                <a:t>addVote</a:t>
               </a:r>
               <a:r>
                 <a:rPr lang="en-SG" sz="1050" dirty="0">
@@ -3886,23 +3934,7 @@
                     <a:schemeClr val="tx1"/>
                   </a:solidFill>
                 </a:rPr>
-                <a:t>(target: Person, </a:t>
-              </a:r>
-              <a:r>
-                <a:rPr lang="en-SG" sz="1050" dirty="0" err="1">
-                  <a:solidFill>
-                    <a:schemeClr val="tx1"/>
-                  </a:solidFill>
-                </a:rPr>
-                <a:t>editedPerson</a:t>
-              </a:r>
-              <a:r>
-                <a:rPr lang="en-SG" sz="1050" dirty="0">
-                  <a:solidFill>
-                    <a:schemeClr val="tx1"/>
-                  </a:solidFill>
-                </a:rPr>
-                <a:t>: target)</a:t>
+                <a:t>(option: String, person: Person)</a:t>
               </a:r>
             </a:p>
             <a:p>
@@ -3920,7 +3952,7 @@
                     <a:schemeClr val="tx1"/>
                   </a:solidFill>
                 </a:rPr>
-                <a:t>displayPoll</a:t>
+                <a:t>updatePerson</a:t>
               </a:r>
               <a:r>
                 <a:rPr lang="en-SG" sz="1050" dirty="0">
@@ -3928,7 +3960,23 @@
                     <a:schemeClr val="tx1"/>
                   </a:solidFill>
                 </a:rPr>
-                <a:t>() : String</a:t>
+                <a:t>(target: Person, </a:t>
+              </a:r>
+              <a:r>
+                <a:rPr lang="en-SG" sz="1050" dirty="0" err="1">
+                  <a:solidFill>
+                    <a:schemeClr val="tx1"/>
+                  </a:solidFill>
+                </a:rPr>
+                <a:t>editedPerson</a:t>
+              </a:r>
+              <a:r>
+                <a:rPr lang="en-SG" sz="1050" dirty="0">
+                  <a:solidFill>
+                    <a:schemeClr val="tx1"/>
+                  </a:solidFill>
+                </a:rPr>
+                <a:t>: target)</a:t>
               </a:r>
             </a:p>
             <a:p>
@@ -3938,7 +3986,7 @@
                     <a:schemeClr val="tx1"/>
                   </a:solidFill>
                 </a:rPr>
-                <a:t>-</a:t>
+                <a:t>+</a:t>
               </a:r>
               <a:r>
                 <a:rPr lang="en-SG" sz="1050" dirty="0" err="1">
@@ -3946,7 +3994,7 @@
                     <a:schemeClr val="tx1"/>
                   </a:solidFill>
                 </a:rPr>
-                <a:t>displayPollData</a:t>
+                <a:t>displayPoll</a:t>
               </a:r>
               <a:r>
                 <a:rPr lang="en-SG" sz="1050" dirty="0">
@@ -3954,7 +4002,7 @@
                     <a:schemeClr val="tx1"/>
                   </a:solidFill>
                 </a:rPr>
-                <a:t>() : String</a:t>
+                <a:t>(): String</a:t>
               </a:r>
             </a:p>
             <a:p>
@@ -3972,7 +4020,7 @@
                     <a:schemeClr val="tx1"/>
                   </a:solidFill>
                 </a:rPr>
-                <a:t>getPopularOptions</a:t>
+                <a:t>displayPollData</a:t>
               </a:r>
               <a:r>
                 <a:rPr lang="en-SG" sz="1050" dirty="0">
@@ -3980,7 +4028,7 @@
                     <a:schemeClr val="tx1"/>
                   </a:solidFill>
                 </a:rPr>
-                <a:t>() : LinkedList&lt;String&gt;</a:t>
+                <a:t>(): String</a:t>
               </a:r>
             </a:p>
             <a:p>
@@ -3990,7 +4038,7 @@
                     <a:schemeClr val="tx1"/>
                   </a:solidFill>
                 </a:rPr>
-                <a:t># </a:t>
+                <a:t>-</a:t>
               </a:r>
               <a:r>
                 <a:rPr lang="en-SG" sz="1050" dirty="0" err="1">
@@ -3998,7 +4046,7 @@
                     <a:schemeClr val="tx1"/>
                   </a:solidFill>
                 </a:rPr>
-                <a:t>copyData</a:t>
+                <a:t>getPopularOptions</a:t>
               </a:r>
               <a:r>
                 <a:rPr lang="en-SG" sz="1050" dirty="0">
@@ -4006,23 +4054,7 @@
                     <a:schemeClr val="tx1"/>
                   </a:solidFill>
                 </a:rPr>
-                <a:t>() : HashMap&lt;String, </a:t>
-              </a:r>
-              <a:r>
-                <a:rPr lang="en-SG" sz="1050" dirty="0" err="1">
-                  <a:solidFill>
-                    <a:schemeClr val="tx1"/>
-                  </a:solidFill>
-                </a:rPr>
-                <a:t>UniquePersonList</a:t>
-              </a:r>
-              <a:r>
-                <a:rPr lang="en-SG" sz="1050" dirty="0">
-                  <a:solidFill>
-                    <a:schemeClr val="tx1"/>
-                  </a:solidFill>
-                </a:rPr>
-                <a:t>&gt;</a:t>
+                <a:t>(): LinkedList&lt;String&gt;</a:t>
               </a:r>
             </a:p>
             <a:p>
@@ -4032,7 +4064,7 @@
                     <a:schemeClr val="tx1"/>
                   </a:solidFill>
                 </a:rPr>
-                <a:t>+ </a:t>
+                <a:t>#</a:t>
               </a:r>
               <a:r>
                 <a:rPr lang="en-SG" sz="1050" dirty="0" err="1">
@@ -4040,7 +4072,7 @@
                     <a:schemeClr val="tx1"/>
                   </a:solidFill>
                 </a:rPr>
-                <a:t>deletePerson</a:t>
+                <a:t>copyData</a:t>
               </a:r>
               <a:r>
                 <a:rPr lang="en-SG" sz="1050" dirty="0">
@@ -4048,7 +4080,23 @@
                     <a:schemeClr val="tx1"/>
                   </a:solidFill>
                 </a:rPr>
-                <a:t>(target: Person)</a:t>
+                <a:t>(): HashMap&lt;String, </a:t>
+              </a:r>
+              <a:r>
+                <a:rPr lang="en-SG" sz="1050" dirty="0" err="1">
+                  <a:solidFill>
+                    <a:schemeClr val="tx1"/>
+                  </a:solidFill>
+                </a:rPr>
+                <a:t>UniquePersonList</a:t>
+              </a:r>
+              <a:r>
+                <a:rPr lang="en-SG" sz="1050" dirty="0">
+                  <a:solidFill>
+                    <a:schemeClr val="tx1"/>
+                  </a:solidFill>
+                </a:rPr>
+                <a:t>&gt;</a:t>
               </a:r>
             </a:p>
             <a:p>
@@ -4058,7 +4106,43 @@
                     <a:schemeClr val="tx1"/>
                   </a:solidFill>
                 </a:rPr>
-                <a:t>+ equals(other: Object) : </a:t>
+                <a:t>+</a:t>
+              </a:r>
+              <a:r>
+                <a:rPr lang="en-SG" sz="1050" dirty="0" err="1">
+                  <a:solidFill>
+                    <a:schemeClr val="tx1"/>
+                  </a:solidFill>
+                </a:rPr>
+                <a:t>deletePerson</a:t>
+              </a:r>
+              <a:r>
+                <a:rPr lang="en-SG" sz="1050" dirty="0">
+                  <a:solidFill>
+                    <a:schemeClr val="tx1"/>
+                  </a:solidFill>
+                </a:rPr>
+                <a:t>(target: Person)</a:t>
+              </a:r>
+            </a:p>
+            <a:p>
+              <a:r>
+                <a:rPr lang="en-SG" sz="1050" dirty="0">
+                  <a:solidFill>
+                    <a:schemeClr val="tx1"/>
+                  </a:solidFill>
+                </a:rPr>
+                <a:t>+copy() {Abstract}</a:t>
+              </a:r>
+            </a:p>
+            <a:p>
+              <a:r>
+                <a:rPr lang="en-SG" sz="1050" dirty="0">
+                  <a:solidFill>
+                    <a:schemeClr val="tx1"/>
+                  </a:solidFill>
+                </a:rPr>
+                <a:t>+equals(other: Object): </a:t>
               </a:r>
               <a:r>
                 <a:rPr lang="en-SG" sz="1050" dirty="0" err="1">
@@ -4091,7 +4175,7 @@
         </p:nvGrpSpPr>
         <p:grpSpPr>
           <a:xfrm>
-            <a:off x="3505200" y="2734304"/>
+            <a:off x="3505200" y="2895600"/>
             <a:ext cx="2595180" cy="1285211"/>
             <a:chOff x="4190999" y="2414625"/>
             <a:chExt cx="2595180" cy="1285211"/>
@@ -4263,7 +4347,7 @@
             <a:p>
               <a:r>
                 <a:rPr lang="en-SG" sz="1100" dirty="0"/>
-                <a:t>+ copy() : Poll</a:t>
+                <a:t>+copy() : Poll</a:t>
               </a:r>
             </a:p>
           </p:txBody>
@@ -4283,8 +4367,8 @@
         </p:nvGrpSpPr>
         <p:grpSpPr>
           <a:xfrm>
-            <a:off x="4988897" y="647535"/>
-            <a:ext cx="3733800" cy="1810791"/>
+            <a:off x="4978805" y="770495"/>
+            <a:ext cx="3545503" cy="1810791"/>
             <a:chOff x="4180908" y="98485"/>
             <a:chExt cx="3733800" cy="1810791"/>
           </a:xfrm>
@@ -4468,7 +4552,7 @@
               </a:r>
               <a:r>
                 <a:rPr lang="en-SG" sz="1100" dirty="0" err="1"/>
-                <a:t>participantList</a:t>
+                <a:t>startDate</a:t>
               </a:r>
               <a:r>
                 <a:rPr lang="en-SG" sz="1100" dirty="0"/>
@@ -4476,17 +4560,45 @@
               </a:r>
               <a:r>
                 <a:rPr lang="en-SG" sz="1100" dirty="0" err="1"/>
-                <a:t>UniquePersonList</a:t>
+                <a:t>LocalDate</a:t>
               </a:r>
               <a:r>
                 <a:rPr lang="en-SG" sz="1100" dirty="0"/>
                 <a:t>, </a:t>
               </a:r>
+              <a:r>
+                <a:rPr lang="en-SG" sz="1100" dirty="0" err="1"/>
+                <a:t>endDate</a:t>
+              </a:r>
+              <a:r>
+                <a:rPr lang="en-SG" sz="1100" dirty="0"/>
+                <a:t>: </a:t>
+              </a:r>
+              <a:r>
+                <a:rPr lang="en-SG" sz="1100" dirty="0" err="1"/>
+                <a:t>LocalDate</a:t>
+              </a:r>
+              <a:r>
+                <a:rPr lang="en-SG" sz="1100" dirty="0"/>
+                <a:t>)</a:t>
+              </a:r>
             </a:p>
             <a:p>
               <a:r>
+                <a:rPr lang="en-SG" sz="1100" dirty="0"/>
+                <a:t>-</a:t>
+              </a:r>
+              <a:r>
                 <a:rPr lang="en-SG" sz="1100" dirty="0" err="1"/>
-                <a:t>startDate</a:t>
+                <a:t>createSharedSchedule</a:t>
+              </a:r>
+              <a:r>
+                <a:rPr lang="en-SG" sz="1100" dirty="0"/>
+                <a:t>(</a:t>
+              </a:r>
+              <a:r>
+                <a:rPr lang="en-SG" sz="1100" dirty="0" err="1"/>
+                <a:t>participantList</a:t>
               </a:r>
               <a:r>
                 <a:rPr lang="en-SG" sz="1100" dirty="0"/>
@@ -4494,23 +4606,7 @@
               </a:r>
               <a:r>
                 <a:rPr lang="en-SG" sz="1100" dirty="0" err="1"/>
-                <a:t>LocalDate</a:t>
-              </a:r>
-              <a:r>
-                <a:rPr lang="en-SG" sz="1100" dirty="0"/>
-                <a:t>, </a:t>
-              </a:r>
-              <a:r>
-                <a:rPr lang="en-SG" sz="1100" dirty="0" err="1"/>
-                <a:t>endDate</a:t>
-              </a:r>
-              <a:r>
-                <a:rPr lang="en-SG" sz="1100" dirty="0"/>
-                <a:t>: </a:t>
-              </a:r>
-              <a:r>
-                <a:rPr lang="en-SG" sz="1100" dirty="0" err="1"/>
-                <a:t>LocalDate</a:t>
+                <a:t>UniquePersonList</a:t>
               </a:r>
               <a:r>
                 <a:rPr lang="en-SG" sz="1100" dirty="0"/>
@@ -4644,7 +4740,7 @@
         <p:spPr>
           <a:xfrm>
             <a:off x="3119808" y="2181161"/>
-            <a:ext cx="1682983" cy="553143"/>
+            <a:ext cx="1682983" cy="714439"/>
           </a:xfrm>
           <a:prstGeom prst="bentConnector2">
             <a:avLst/>
@@ -4683,13 +4779,13 @@
         </p:nvCxnSpPr>
         <p:spPr>
           <a:xfrm flipV="1">
-            <a:off x="3119808" y="647535"/>
-            <a:ext cx="3735989" cy="1533626"/>
+            <a:off x="3119808" y="770495"/>
+            <a:ext cx="3631749" cy="1410666"/>
           </a:xfrm>
           <a:prstGeom prst="bentConnector4">
             <a:avLst>
-              <a:gd name="adj1" fmla="val 23335"/>
-              <a:gd name="adj2" fmla="val 114906"/>
+              <a:gd name="adj1" fmla="val 23865"/>
+              <a:gd name="adj2" fmla="val 116205"/>
             </a:avLst>
           </a:prstGeom>
         </p:spPr>

</xml_diff>